<commit_message>
docs: update MCP servers presentation slides
</commit_message>
<xml_diff>
--- a/MCP_Servers_Presentation.pptx
+++ b/MCP_Servers_Presentation.pptx
@@ -5,28 +5,29 @@
     <p:sldMasterId id="2147483648" r:id="rId1"/>
   </p:sldMasterIdLst>
   <p:notesMasterIdLst>
-    <p:notesMasterId r:id="rId21"/>
+    <p:notesMasterId r:id="rId22"/>
   </p:notesMasterIdLst>
   <p:sldIdLst>
     <p:sldId id="2561" r:id="rId2"/>
-    <p:sldId id="2562" r:id="rId3"/>
-    <p:sldId id="2563" r:id="rId4"/>
-    <p:sldId id="2564" r:id="rId5"/>
-    <p:sldId id="2565" r:id="rId6"/>
-    <p:sldId id="2566" r:id="rId7"/>
-    <p:sldId id="2567" r:id="rId8"/>
-    <p:sldId id="2576" r:id="rId9"/>
-    <p:sldId id="2577" r:id="rId10"/>
-    <p:sldId id="2568" r:id="rId11"/>
-    <p:sldId id="2569" r:id="rId12"/>
-    <p:sldId id="2570" r:id="rId13"/>
-    <p:sldId id="2571" r:id="rId14"/>
-    <p:sldId id="2578" r:id="rId15"/>
-    <p:sldId id="2572" r:id="rId16"/>
-    <p:sldId id="2573" r:id="rId17"/>
-    <p:sldId id="2579" r:id="rId18"/>
-    <p:sldId id="2574" r:id="rId19"/>
-    <p:sldId id="2575" r:id="rId20"/>
+    <p:sldId id="260" r:id="rId3"/>
+    <p:sldId id="2562" r:id="rId4"/>
+    <p:sldId id="2563" r:id="rId5"/>
+    <p:sldId id="2564" r:id="rId6"/>
+    <p:sldId id="2565" r:id="rId7"/>
+    <p:sldId id="2566" r:id="rId8"/>
+    <p:sldId id="2567" r:id="rId9"/>
+    <p:sldId id="2576" r:id="rId10"/>
+    <p:sldId id="2577" r:id="rId11"/>
+    <p:sldId id="2568" r:id="rId12"/>
+    <p:sldId id="2569" r:id="rId13"/>
+    <p:sldId id="2570" r:id="rId14"/>
+    <p:sldId id="2571" r:id="rId15"/>
+    <p:sldId id="2578" r:id="rId16"/>
+    <p:sldId id="2572" r:id="rId17"/>
+    <p:sldId id="2573" r:id="rId18"/>
+    <p:sldId id="2579" r:id="rId19"/>
+    <p:sldId id="2574" r:id="rId20"/>
+    <p:sldId id="2575" r:id="rId21"/>
   </p:sldIdLst>
   <p:sldSz cx="12192000" cy="6858000"/>
   <p:notesSz cx="6858000" cy="9144000"/>
@@ -131,6 +132,7 @@
         <p14:section name="Tools in your AI's Toolbox: An Introduction to MCP Servers" id="{A0B2B2BF-23B8-42C4-9D14-74B2C16D1CEB}">
           <p14:sldIdLst>
             <p14:sldId id="2561"/>
+            <p14:sldId id="260"/>
           </p14:sldIdLst>
         </p14:section>
         <p14:section name="Introduction to MCP Servers" id="{FA0C23B1-3AFA-44D2-8FA0-2F6378EA9F6B}">
@@ -698,7 +700,7 @@
           <a:lstStyle/>
           <a:p>
             <a:fld id="{322C3404-B6AB-4EFE-9F4E-60BD52F02861}" type="slidenum">
-              <a:t>12</a:t>
+              <a:t>13</a:t>
             </a:fld>
             <a:endParaRPr lang="en-US"/>
           </a:p>
@@ -785,7 +787,7 @@
           <a:lstStyle/>
           <a:p>
             <a:fld id="{322C3404-B6AB-4EFE-9F4E-60BD52F02861}" type="slidenum">
-              <a:t>13</a:t>
+              <a:t>14</a:t>
             </a:fld>
             <a:endParaRPr lang="en-US"/>
           </a:p>
@@ -871,7 +873,7 @@
           <a:lstStyle/>
           <a:p>
             <a:fld id="{322C3404-B6AB-4EFE-9F4E-60BD52F02861}" type="slidenum">
-              <a:t>15</a:t>
+              <a:t>16</a:t>
             </a:fld>
             <a:endParaRPr lang="en-US"/>
           </a:p>
@@ -958,7 +960,7 @@
           <a:lstStyle/>
           <a:p>
             <a:fld id="{322C3404-B6AB-4EFE-9F4E-60BD52F02861}" type="slidenum">
-              <a:t>16</a:t>
+              <a:t>17</a:t>
             </a:fld>
             <a:endParaRPr lang="en-US"/>
           </a:p>
@@ -1044,7 +1046,7 @@
           <a:lstStyle/>
           <a:p>
             <a:fld id="{322C3404-B6AB-4EFE-9F4E-60BD52F02861}" type="slidenum">
-              <a:t>18</a:t>
+              <a:t>19</a:t>
             </a:fld>
             <a:endParaRPr lang="en-US"/>
           </a:p>
@@ -1131,7 +1133,7 @@
           <a:lstStyle/>
           <a:p>
             <a:fld id="{322C3404-B6AB-4EFE-9F4E-60BD52F02861}" type="slidenum">
-              <a:t>19</a:t>
+              <a:t>20</a:t>
             </a:fld>
             <a:endParaRPr lang="en-US"/>
           </a:p>
@@ -1217,7 +1219,7 @@
           <a:lstStyle/>
           <a:p>
             <a:fld id="{322C3404-B6AB-4EFE-9F4E-60BD52F02861}" type="slidenum">
-              <a:t>2</a:t>
+              <a:t>3</a:t>
             </a:fld>
             <a:endParaRPr lang="en-US"/>
           </a:p>
@@ -1304,7 +1306,7 @@
           <a:lstStyle/>
           <a:p>
             <a:fld id="{322C3404-B6AB-4EFE-9F4E-60BD52F02861}" type="slidenum">
-              <a:t>3</a:t>
+              <a:t>4</a:t>
             </a:fld>
             <a:endParaRPr lang="en-US"/>
           </a:p>
@@ -1390,7 +1392,7 @@
           <a:lstStyle/>
           <a:p>
             <a:fld id="{322C3404-B6AB-4EFE-9F4E-60BD52F02861}" type="slidenum">
-              <a:t>4</a:t>
+              <a:t>5</a:t>
             </a:fld>
             <a:endParaRPr lang="en-US"/>
           </a:p>
@@ -1477,7 +1479,7 @@
           <a:lstStyle/>
           <a:p>
             <a:fld id="{322C3404-B6AB-4EFE-9F4E-60BD52F02861}" type="slidenum">
-              <a:t>5</a:t>
+              <a:t>6</a:t>
             </a:fld>
             <a:endParaRPr lang="en-US"/>
           </a:p>
@@ -1563,7 +1565,7 @@
           <a:lstStyle/>
           <a:p>
             <a:fld id="{322C3404-B6AB-4EFE-9F4E-60BD52F02861}" type="slidenum">
-              <a:t>6</a:t>
+              <a:t>7</a:t>
             </a:fld>
             <a:endParaRPr lang="en-US"/>
           </a:p>
@@ -1650,7 +1652,7 @@
           <a:lstStyle/>
           <a:p>
             <a:fld id="{322C3404-B6AB-4EFE-9F4E-60BD52F02861}" type="slidenum">
-              <a:t>7</a:t>
+              <a:t>8</a:t>
             </a:fld>
             <a:endParaRPr lang="en-US"/>
           </a:p>
@@ -1736,7 +1738,7 @@
           <a:lstStyle/>
           <a:p>
             <a:fld id="{322C3404-B6AB-4EFE-9F4E-60BD52F02861}" type="slidenum">
-              <a:t>10</a:t>
+              <a:t>11</a:t>
             </a:fld>
             <a:endParaRPr lang="en-US"/>
           </a:p>
@@ -1823,7 +1825,7 @@
           <a:lstStyle/>
           <a:p>
             <a:fld id="{322C3404-B6AB-4EFE-9F4E-60BD52F02861}" type="slidenum">
-              <a:t>11</a:t>
+              <a:t>12</a:t>
             </a:fld>
             <a:endParaRPr lang="en-US"/>
           </a:p>
@@ -20726,6 +20728,500 @@
 </p:sldLayout>
 </file>
 
+<file path=ppt/slideLayouts/slideLayout51.xml><?xml version="1.0" encoding="utf-8"?>
+<p:sldLayout xmlns:a="http://schemas.openxmlformats.org/drawingml/2006/main" xmlns:r="http://schemas.openxmlformats.org/officeDocument/2006/relationships" xmlns:p="http://schemas.openxmlformats.org/presentationml/2006/main">
+  <p:cSld name="1_Two Content">
+    <p:spTree>
+      <p:nvGrpSpPr>
+        <p:cNvPr id="1" name=""/>
+        <p:cNvGrpSpPr/>
+        <p:nvPr/>
+      </p:nvGrpSpPr>
+      <p:grpSpPr>
+        <a:xfrm>
+          <a:off x="0" y="0"/>
+          <a:ext cx="0" cy="0"/>
+          <a:chOff x="0" y="0"/>
+          <a:chExt cx="0" cy="0"/>
+        </a:xfrm>
+      </p:grpSpPr>
+      <p:sp>
+        <p:nvSpPr>
+          <p:cNvPr id="9" name="Content Placeholder 8"/>
+          <p:cNvSpPr>
+            <a:spLocks noGrp="1"/>
+          </p:cNvSpPr>
+          <p:nvPr>
+            <p:ph sz="quarter" idx="13"/>
+          </p:nvPr>
+        </p:nvSpPr>
+        <p:spPr>
+          <a:xfrm>
+            <a:off x="294640" y="1284923"/>
+            <a:ext cx="5705856" cy="4874578"/>
+          </a:xfrm>
+        </p:spPr>
+        <p:txBody>
+          <a:bodyPr/>
+          <a:lstStyle>
+            <a:lvl1pPr>
+              <a:defRPr>
+                <a:solidFill>
+                  <a:schemeClr val="accent6"/>
+                </a:solidFill>
+              </a:defRPr>
+            </a:lvl1pPr>
+            <a:lvl2pPr>
+              <a:defRPr>
+                <a:solidFill>
+                  <a:schemeClr val="accent6"/>
+                </a:solidFill>
+              </a:defRPr>
+            </a:lvl2pPr>
+            <a:lvl3pPr>
+              <a:defRPr>
+                <a:solidFill>
+                  <a:schemeClr val="accent6"/>
+                </a:solidFill>
+              </a:defRPr>
+            </a:lvl3pPr>
+            <a:lvl4pPr>
+              <a:defRPr>
+                <a:solidFill>
+                  <a:schemeClr val="accent6"/>
+                </a:solidFill>
+              </a:defRPr>
+            </a:lvl4pPr>
+            <a:lvl5pPr>
+              <a:defRPr>
+                <a:solidFill>
+                  <a:schemeClr val="accent6"/>
+                </a:solidFill>
+              </a:defRPr>
+            </a:lvl5pPr>
+          </a:lstStyle>
+          <a:p>
+            <a:pPr lvl="0"/>
+            <a:r>
+              <a:rPr lang="en-US"/>
+              <a:t>Click to edit Master text styles</a:t>
+            </a:r>
+          </a:p>
+          <a:p>
+            <a:pPr lvl="1"/>
+            <a:r>
+              <a:rPr lang="en-US"/>
+              <a:t>Second level</a:t>
+            </a:r>
+          </a:p>
+          <a:p>
+            <a:pPr lvl="2"/>
+            <a:r>
+              <a:rPr lang="en-US"/>
+              <a:t>Third level</a:t>
+            </a:r>
+          </a:p>
+          <a:p>
+            <a:pPr lvl="3"/>
+            <a:r>
+              <a:rPr lang="en-US"/>
+              <a:t>Fourth level</a:t>
+            </a:r>
+          </a:p>
+          <a:p>
+            <a:pPr lvl="4"/>
+            <a:r>
+              <a:rPr lang="en-US"/>
+              <a:t>Fifth level</a:t>
+            </a:r>
+          </a:p>
+        </p:txBody>
+      </p:sp>
+      <p:sp>
+        <p:nvSpPr>
+          <p:cNvPr id="11" name="Content Placeholder 10"/>
+          <p:cNvSpPr>
+            <a:spLocks noGrp="1"/>
+          </p:cNvSpPr>
+          <p:nvPr>
+            <p:ph sz="quarter" idx="14"/>
+          </p:nvPr>
+        </p:nvSpPr>
+        <p:spPr>
+          <a:xfrm>
+            <a:off x="6244336" y="1284924"/>
+            <a:ext cx="5730240" cy="4874577"/>
+          </a:xfrm>
+        </p:spPr>
+        <p:txBody>
+          <a:bodyPr/>
+          <a:lstStyle>
+            <a:lvl1pPr>
+              <a:defRPr>
+                <a:solidFill>
+                  <a:schemeClr val="accent6"/>
+                </a:solidFill>
+              </a:defRPr>
+            </a:lvl1pPr>
+            <a:lvl2pPr>
+              <a:defRPr>
+                <a:solidFill>
+                  <a:schemeClr val="accent6"/>
+                </a:solidFill>
+              </a:defRPr>
+            </a:lvl2pPr>
+            <a:lvl3pPr>
+              <a:defRPr>
+                <a:solidFill>
+                  <a:schemeClr val="accent6"/>
+                </a:solidFill>
+              </a:defRPr>
+            </a:lvl3pPr>
+            <a:lvl4pPr>
+              <a:defRPr>
+                <a:solidFill>
+                  <a:schemeClr val="accent6"/>
+                </a:solidFill>
+              </a:defRPr>
+            </a:lvl4pPr>
+            <a:lvl5pPr>
+              <a:defRPr>
+                <a:solidFill>
+                  <a:schemeClr val="accent6"/>
+                </a:solidFill>
+              </a:defRPr>
+            </a:lvl5pPr>
+          </a:lstStyle>
+          <a:p>
+            <a:pPr lvl="0"/>
+            <a:r>
+              <a:rPr lang="en-US"/>
+              <a:t>Click to edit Master text styles</a:t>
+            </a:r>
+          </a:p>
+          <a:p>
+            <a:pPr lvl="1"/>
+            <a:r>
+              <a:rPr lang="en-US"/>
+              <a:t>Second level</a:t>
+            </a:r>
+          </a:p>
+          <a:p>
+            <a:pPr lvl="2"/>
+            <a:r>
+              <a:rPr lang="en-US"/>
+              <a:t>Third level</a:t>
+            </a:r>
+          </a:p>
+          <a:p>
+            <a:pPr lvl="3"/>
+            <a:r>
+              <a:rPr lang="en-US"/>
+              <a:t>Fourth level</a:t>
+            </a:r>
+          </a:p>
+          <a:p>
+            <a:pPr lvl="4"/>
+            <a:r>
+              <a:rPr lang="en-US"/>
+              <a:t>Fifth level</a:t>
+            </a:r>
+          </a:p>
+        </p:txBody>
+      </p:sp>
+      <p:sp>
+        <p:nvSpPr>
+          <p:cNvPr id="8" name="Title 1"/>
+          <p:cNvSpPr>
+            <a:spLocks noGrp="1"/>
+          </p:cNvSpPr>
+          <p:nvPr>
+            <p:ph type="title" hasCustomPrompt="1"/>
+          </p:nvPr>
+        </p:nvSpPr>
+        <p:spPr>
+          <a:xfrm>
+            <a:off x="289400" y="169154"/>
+            <a:ext cx="11634376" cy="654576"/>
+          </a:xfrm>
+        </p:spPr>
+        <p:txBody>
+          <a:bodyPr>
+            <a:normAutofit/>
+          </a:bodyPr>
+          <a:lstStyle>
+            <a:lvl1pPr>
+              <a:defRPr sz="3600" b="1" i="0" baseline="0">
+                <a:solidFill>
+                  <a:schemeClr val="tx1"/>
+                </a:solidFill>
+                <a:latin typeface="+mj-lt"/>
+                <a:ea typeface="Tahoma" charset="0"/>
+                <a:cs typeface="Tahoma" charset="0"/>
+              </a:defRPr>
+            </a:lvl1pPr>
+          </a:lstStyle>
+          <a:p>
+            <a:r>
+              <a:rPr lang="en-US"/>
+              <a:t>Slide Title</a:t>
+            </a:r>
+          </a:p>
+        </p:txBody>
+      </p:sp>
+      <p:sp>
+        <p:nvSpPr>
+          <p:cNvPr id="10" name="Subtitle 2"/>
+          <p:cNvSpPr>
+            <a:spLocks noGrp="1"/>
+          </p:cNvSpPr>
+          <p:nvPr>
+            <p:ph type="subTitle" idx="15" hasCustomPrompt="1"/>
+          </p:nvPr>
+        </p:nvSpPr>
+        <p:spPr>
+          <a:xfrm>
+            <a:off x="289400" y="823731"/>
+            <a:ext cx="11634376" cy="340973"/>
+          </a:xfrm>
+        </p:spPr>
+        <p:txBody>
+          <a:bodyPr>
+            <a:normAutofit/>
+          </a:bodyPr>
+          <a:lstStyle>
+            <a:lvl1pPr marL="0" indent="0" algn="l">
+              <a:buNone/>
+              <a:defRPr sz="1600" b="0" i="0">
+                <a:solidFill>
+                  <a:schemeClr val="tx1"/>
+                </a:solidFill>
+                <a:latin typeface="+mn-lt"/>
+                <a:ea typeface="Tahoma" charset="0"/>
+                <a:cs typeface="Tahoma" charset="0"/>
+              </a:defRPr>
+            </a:lvl1pPr>
+            <a:lvl2pPr marL="342900" indent="0" algn="ctr">
+              <a:buNone/>
+              <a:defRPr>
+                <a:solidFill>
+                  <a:schemeClr val="tx1">
+                    <a:tint val="75000"/>
+                  </a:schemeClr>
+                </a:solidFill>
+              </a:defRPr>
+            </a:lvl2pPr>
+            <a:lvl3pPr marL="685800" indent="0" algn="ctr">
+              <a:buNone/>
+              <a:defRPr>
+                <a:solidFill>
+                  <a:schemeClr val="tx1">
+                    <a:tint val="75000"/>
+                  </a:schemeClr>
+                </a:solidFill>
+              </a:defRPr>
+            </a:lvl3pPr>
+            <a:lvl4pPr marL="1028700" indent="0" algn="ctr">
+              <a:buNone/>
+              <a:defRPr>
+                <a:solidFill>
+                  <a:schemeClr val="tx1">
+                    <a:tint val="75000"/>
+                  </a:schemeClr>
+                </a:solidFill>
+              </a:defRPr>
+            </a:lvl4pPr>
+            <a:lvl5pPr marL="1371600" indent="0" algn="ctr">
+              <a:buNone/>
+              <a:defRPr>
+                <a:solidFill>
+                  <a:schemeClr val="tx1">
+                    <a:tint val="75000"/>
+                  </a:schemeClr>
+                </a:solidFill>
+              </a:defRPr>
+            </a:lvl5pPr>
+            <a:lvl6pPr marL="1714500" indent="0" algn="ctr">
+              <a:buNone/>
+              <a:defRPr>
+                <a:solidFill>
+                  <a:schemeClr val="tx1">
+                    <a:tint val="75000"/>
+                  </a:schemeClr>
+                </a:solidFill>
+              </a:defRPr>
+            </a:lvl6pPr>
+            <a:lvl7pPr marL="2057400" indent="0" algn="ctr">
+              <a:buNone/>
+              <a:defRPr>
+                <a:solidFill>
+                  <a:schemeClr val="tx1">
+                    <a:tint val="75000"/>
+                  </a:schemeClr>
+                </a:solidFill>
+              </a:defRPr>
+            </a:lvl7pPr>
+            <a:lvl8pPr marL="2400300" indent="0" algn="ctr">
+              <a:buNone/>
+              <a:defRPr>
+                <a:solidFill>
+                  <a:schemeClr val="tx1">
+                    <a:tint val="75000"/>
+                  </a:schemeClr>
+                </a:solidFill>
+              </a:defRPr>
+            </a:lvl8pPr>
+            <a:lvl9pPr marL="2743200" indent="0" algn="ctr">
+              <a:buNone/>
+              <a:defRPr>
+                <a:solidFill>
+                  <a:schemeClr val="tx1">
+                    <a:tint val="75000"/>
+                  </a:schemeClr>
+                </a:solidFill>
+              </a:defRPr>
+            </a:lvl9pPr>
+          </a:lstStyle>
+          <a:p>
+            <a:r>
+              <a:rPr lang="en-US"/>
+              <a:t>Click to edit Master subtitle style </a:t>
+            </a:r>
+          </a:p>
+        </p:txBody>
+      </p:sp>
+      <p:sp>
+        <p:nvSpPr>
+          <p:cNvPr id="15" name="Date Placeholder 3"/>
+          <p:cNvSpPr>
+            <a:spLocks noGrp="1"/>
+          </p:cNvSpPr>
+          <p:nvPr>
+            <p:ph type="dt" sz="half" idx="2"/>
+          </p:nvPr>
+        </p:nvSpPr>
+        <p:spPr>
+          <a:xfrm>
+            <a:off x="1251588" y="6356353"/>
+            <a:ext cx="1210733" cy="365125"/>
+          </a:xfrm>
+          <a:prstGeom prst="rect">
+            <a:avLst/>
+          </a:prstGeom>
+        </p:spPr>
+        <p:txBody>
+          <a:bodyPr vert="horz" lIns="91440" tIns="45720" rIns="91440" bIns="45720" rtlCol="0" anchor="ctr"/>
+          <a:lstStyle>
+            <a:lvl1pPr algn="l">
+              <a:defRPr sz="1200">
+                <a:solidFill>
+                  <a:schemeClr val="tx1">
+                    <a:tint val="75000"/>
+                  </a:schemeClr>
+                </a:solidFill>
+              </a:defRPr>
+            </a:lvl1pPr>
+          </a:lstStyle>
+          <a:p>
+            <a:fld id="{6048702F-412C-4CEF-ABE7-C49B765E9059}" type="datetimeFigureOut">
+              <a:rPr lang="en-US" smtClean="0"/>
+              <a:t>9/3/2025</a:t>
+            </a:fld>
+            <a:endParaRPr lang="en-US"/>
+          </a:p>
+        </p:txBody>
+      </p:sp>
+      <p:sp>
+        <p:nvSpPr>
+          <p:cNvPr id="16" name="Footer Placeholder 4"/>
+          <p:cNvSpPr>
+            <a:spLocks noGrp="1"/>
+          </p:cNvSpPr>
+          <p:nvPr>
+            <p:ph type="ftr" sz="quarter" idx="3"/>
+          </p:nvPr>
+        </p:nvSpPr>
+        <p:spPr>
+          <a:xfrm>
+            <a:off x="2654042" y="6356353"/>
+            <a:ext cx="7773705" cy="365125"/>
+          </a:xfrm>
+          <a:prstGeom prst="rect">
+            <a:avLst/>
+          </a:prstGeom>
+        </p:spPr>
+        <p:txBody>
+          <a:bodyPr vert="horz" lIns="91440" tIns="45720" rIns="91440" bIns="45720" rtlCol="0" anchor="ctr"/>
+          <a:lstStyle>
+            <a:lvl1pPr algn="ctr">
+              <a:defRPr sz="1200">
+                <a:solidFill>
+                  <a:schemeClr val="tx1">
+                    <a:tint val="75000"/>
+                  </a:schemeClr>
+                </a:solidFill>
+              </a:defRPr>
+            </a:lvl1pPr>
+          </a:lstStyle>
+          <a:p>
+            <a:endParaRPr lang="en-US"/>
+          </a:p>
+        </p:txBody>
+      </p:sp>
+      <p:sp>
+        <p:nvSpPr>
+          <p:cNvPr id="17" name="Slide Number Placeholder 5"/>
+          <p:cNvSpPr>
+            <a:spLocks noGrp="1"/>
+          </p:cNvSpPr>
+          <p:nvPr>
+            <p:ph type="sldNum" sz="quarter" idx="4"/>
+          </p:nvPr>
+        </p:nvSpPr>
+        <p:spPr>
+          <a:xfrm>
+            <a:off x="289400" y="6356353"/>
+            <a:ext cx="770467" cy="365125"/>
+          </a:xfrm>
+          <a:prstGeom prst="rect">
+            <a:avLst/>
+          </a:prstGeom>
+        </p:spPr>
+        <p:txBody>
+          <a:bodyPr vert="horz" lIns="91440" tIns="45720" rIns="91440" bIns="45720" rtlCol="0" anchor="ctr"/>
+          <a:lstStyle>
+            <a:lvl1pPr algn="r">
+              <a:defRPr sz="1200">
+                <a:solidFill>
+                  <a:schemeClr val="tx1">
+                    <a:tint val="75000"/>
+                  </a:schemeClr>
+                </a:solidFill>
+              </a:defRPr>
+            </a:lvl1pPr>
+          </a:lstStyle>
+          <a:p>
+            <a:fld id="{AC14B51C-DFC7-4853-98B8-136744874381}" type="slidenum">
+              <a:rPr lang="en-US" smtClean="0"/>
+              <a:t>‹#›</a:t>
+            </a:fld>
+            <a:endParaRPr lang="en-US"/>
+          </a:p>
+        </p:txBody>
+      </p:sp>
+    </p:spTree>
+    <p:extLst>
+      <p:ext uri="{BB962C8B-B14F-4D97-AF65-F5344CB8AC3E}">
+        <p14:creationId xmlns:p14="http://schemas.microsoft.com/office/powerpoint/2010/main" val="4109001649"/>
+      </p:ext>
+    </p:extLst>
+  </p:cSld>
+  <p:clrMapOvr>
+    <a:masterClrMapping/>
+  </p:clrMapOvr>
+</p:sldLayout>
+</file>
+
 <file path=ppt/slideLayouts/slideLayout6.xml><?xml version="1.0" encoding="utf-8"?>
 <p:sldLayout xmlns:a="http://schemas.openxmlformats.org/drawingml/2006/main" xmlns:r="http://schemas.openxmlformats.org/officeDocument/2006/relationships" xmlns:p="http://schemas.openxmlformats.org/presentationml/2006/main" type="title" preserve="1">
   <p:cSld name="Title 2">
@@ -22533,6 +23029,7 @@
     <p:sldLayoutId id="2147483708" r:id="rId48"/>
     <p:sldLayoutId id="2147483709" r:id="rId49"/>
     <p:sldLayoutId id="2147483710" r:id="rId50"/>
+    <p:sldLayoutId id="2147483711" r:id="rId51"/>
   </p:sldLayoutIdLst>
   <p:txStyles>
     <p:titleStyle>
@@ -23208,6 +23705,92 @@
       </p:grpSpPr>
       <p:sp>
         <p:nvSpPr>
+          <p:cNvPr id="5" name="Title 4">
+            <a:extLst>
+              <a:ext uri="{FF2B5EF4-FFF2-40B4-BE49-F238E27FC236}">
+                <a16:creationId xmlns:a16="http://schemas.microsoft.com/office/drawing/2014/main" id="{A18D4A22-5F39-C9F4-EF5A-FB81BC8128D7}"/>
+              </a:ext>
+            </a:extLst>
+          </p:cNvPr>
+          <p:cNvSpPr>
+            <a:spLocks noGrp="1"/>
+          </p:cNvSpPr>
+          <p:nvPr>
+            <p:ph type="ctrTitle"/>
+          </p:nvPr>
+        </p:nvSpPr>
+        <p:spPr/>
+        <p:txBody>
+          <a:bodyPr/>
+          <a:lstStyle/>
+          <a:p>
+            <a:r>
+              <a:rPr lang="en-US" dirty="0"/>
+              <a:t>GitHub Remote Server</a:t>
+            </a:r>
+          </a:p>
+        </p:txBody>
+      </p:sp>
+      <p:sp>
+        <p:nvSpPr>
+          <p:cNvPr id="6" name="Subtitle 5">
+            <a:extLst>
+              <a:ext uri="{FF2B5EF4-FFF2-40B4-BE49-F238E27FC236}">
+                <a16:creationId xmlns:a16="http://schemas.microsoft.com/office/drawing/2014/main" id="{43994C03-9C0C-B305-596C-072F88C94D5B}"/>
+              </a:ext>
+            </a:extLst>
+          </p:cNvPr>
+          <p:cNvSpPr>
+            <a:spLocks noGrp="1"/>
+          </p:cNvSpPr>
+          <p:nvPr>
+            <p:ph type="subTitle" idx="1"/>
+          </p:nvPr>
+        </p:nvSpPr>
+        <p:spPr/>
+        <p:txBody>
+          <a:bodyPr/>
+          <a:lstStyle/>
+          <a:p>
+            <a:r>
+              <a:rPr lang="en-US" dirty="0"/>
+              <a:t>Demonstration</a:t>
+            </a:r>
+          </a:p>
+        </p:txBody>
+      </p:sp>
+    </p:spTree>
+    <p:extLst>
+      <p:ext uri="{BB962C8B-B14F-4D97-AF65-F5344CB8AC3E}">
+        <p14:creationId xmlns:p14="http://schemas.microsoft.com/office/powerpoint/2010/main" val="1803766686"/>
+      </p:ext>
+    </p:extLst>
+  </p:cSld>
+  <p:clrMapOvr>
+    <a:masterClrMapping/>
+  </p:clrMapOvr>
+</p:sld>
+</file>
+
+<file path=ppt/slides/slide11.xml><?xml version="1.0" encoding="utf-8"?>
+<p:sld xmlns:a="http://schemas.openxmlformats.org/drawingml/2006/main" xmlns:r="http://schemas.openxmlformats.org/officeDocument/2006/relationships" xmlns:p="http://schemas.openxmlformats.org/presentationml/2006/main">
+  <p:cSld>
+    <p:spTree>
+      <p:nvGrpSpPr>
+        <p:cNvPr id="1" name=""/>
+        <p:cNvGrpSpPr/>
+        <p:nvPr/>
+      </p:nvGrpSpPr>
+      <p:grpSpPr>
+        <a:xfrm>
+          <a:off x="0" y="0"/>
+          <a:ext cx="0" cy="0"/>
+          <a:chOff x="0" y="0"/>
+          <a:chExt cx="0" cy="0"/>
+        </a:xfrm>
+      </p:grpSpPr>
+      <p:sp>
+        <p:nvSpPr>
           <p:cNvPr id="2" name="Title 1">
             <a:extLst>
               <a:ext uri="{FF2B5EF4-FFF2-40B4-BE49-F238E27FC236}">
@@ -23349,7 +23932,7 @@
 </p:sld>
 </file>
 
-<file path=ppt/slides/slide11.xml><?xml version="1.0" encoding="utf-8"?>
+<file path=ppt/slides/slide12.xml><?xml version="1.0" encoding="utf-8"?>
 <p:sld xmlns:a="http://schemas.openxmlformats.org/drawingml/2006/main" xmlns:r="http://schemas.openxmlformats.org/officeDocument/2006/relationships" xmlns:p="http://schemas.openxmlformats.org/presentationml/2006/main">
   <p:cSld>
     <p:spTree>
@@ -23720,7 +24303,7 @@
 </p:sld>
 </file>
 
-<file path=ppt/slides/slide12.xml><?xml version="1.0" encoding="utf-8"?>
+<file path=ppt/slides/slide13.xml><?xml version="1.0" encoding="utf-8"?>
 <p:sld xmlns:a="http://schemas.openxmlformats.org/drawingml/2006/main" xmlns:r="http://schemas.openxmlformats.org/officeDocument/2006/relationships" xmlns:p="http://schemas.openxmlformats.org/presentationml/2006/main">
   <p:cSld>
     <p:spTree>
@@ -23880,7 +24463,7 @@
 </p:sld>
 </file>
 
-<file path=ppt/slides/slide13.xml><?xml version="1.0" encoding="utf-8"?>
+<file path=ppt/slides/slide14.xml><?xml version="1.0" encoding="utf-8"?>
 <p:sld xmlns:a="http://schemas.openxmlformats.org/drawingml/2006/main" xmlns:r="http://schemas.openxmlformats.org/officeDocument/2006/relationships" xmlns:p="http://schemas.openxmlformats.org/presentationml/2006/main">
   <p:cSld>
     <p:spTree>
@@ -24251,7 +24834,7 @@
 </p:sld>
 </file>
 
-<file path=ppt/slides/slide14.xml><?xml version="1.0" encoding="utf-8"?>
+<file path=ppt/slides/slide15.xml><?xml version="1.0" encoding="utf-8"?>
 <p:sld xmlns:a="http://schemas.openxmlformats.org/drawingml/2006/main" xmlns:r="http://schemas.openxmlformats.org/officeDocument/2006/relationships" xmlns:p="http://schemas.openxmlformats.org/presentationml/2006/main">
   <p:cSld>
     <p:spTree>
@@ -24347,7 +24930,7 @@
 </p:sld>
 </file>
 
-<file path=ppt/slides/slide15.xml><?xml version="1.0" encoding="utf-8"?>
+<file path=ppt/slides/slide16.xml><?xml version="1.0" encoding="utf-8"?>
 <p:sld xmlns:a="http://schemas.openxmlformats.org/drawingml/2006/main" xmlns:r="http://schemas.openxmlformats.org/officeDocument/2006/relationships" xmlns:p="http://schemas.openxmlformats.org/presentationml/2006/main">
   <p:cSld>
     <p:spTree>
@@ -24507,7 +25090,7 @@
 </p:sld>
 </file>
 
-<file path=ppt/slides/slide16.xml><?xml version="1.0" encoding="utf-8"?>
+<file path=ppt/slides/slide17.xml><?xml version="1.0" encoding="utf-8"?>
 <p:sld xmlns:a="http://schemas.openxmlformats.org/drawingml/2006/main" xmlns:r="http://schemas.openxmlformats.org/officeDocument/2006/relationships" xmlns:p="http://schemas.openxmlformats.org/presentationml/2006/main">
   <p:cSld>
     <p:spTree>
@@ -24878,7 +25461,7 @@
 </p:sld>
 </file>
 
-<file path=ppt/slides/slide17.xml><?xml version="1.0" encoding="utf-8"?>
+<file path=ppt/slides/slide18.xml><?xml version="1.0" encoding="utf-8"?>
 <p:sld xmlns:a="http://schemas.openxmlformats.org/drawingml/2006/main" xmlns:r="http://schemas.openxmlformats.org/officeDocument/2006/relationships" xmlns:p="http://schemas.openxmlformats.org/presentationml/2006/main">
   <p:cSld>
     <p:spTree>
@@ -24970,7 +25553,7 @@
 </p:sld>
 </file>
 
-<file path=ppt/slides/slide18.xml><?xml version="1.0" encoding="utf-8"?>
+<file path=ppt/slides/slide19.xml><?xml version="1.0" encoding="utf-8"?>
 <p:sld xmlns:a="http://schemas.openxmlformats.org/drawingml/2006/main" xmlns:r="http://schemas.openxmlformats.org/officeDocument/2006/relationships" xmlns:p="http://schemas.openxmlformats.org/presentationml/2006/main">
   <p:cSld>
     <p:spTree>
@@ -25130,7 +25713,213 @@
 </p:sld>
 </file>
 
-<file path=ppt/slides/slide19.xml><?xml version="1.0" encoding="utf-8"?>
+<file path=ppt/slides/slide2.xml><?xml version="1.0" encoding="utf-8"?>
+<p:sld xmlns:a="http://schemas.openxmlformats.org/drawingml/2006/main" xmlns:r="http://schemas.openxmlformats.org/officeDocument/2006/relationships" xmlns:p="http://schemas.openxmlformats.org/presentationml/2006/main">
+  <p:cSld>
+    <p:spTree>
+      <p:nvGrpSpPr>
+        <p:cNvPr id="1" name=""/>
+        <p:cNvGrpSpPr/>
+        <p:nvPr/>
+      </p:nvGrpSpPr>
+      <p:grpSpPr>
+        <a:xfrm>
+          <a:off x="0" y="0"/>
+          <a:ext cx="0" cy="0"/>
+          <a:chOff x="0" y="0"/>
+          <a:chExt cx="0" cy="0"/>
+        </a:xfrm>
+      </p:grpSpPr>
+      <p:sp>
+        <p:nvSpPr>
+          <p:cNvPr id="5" name="Title 4">
+            <a:extLst>
+              <a:ext uri="{FF2B5EF4-FFF2-40B4-BE49-F238E27FC236}">
+                <a16:creationId xmlns:a16="http://schemas.microsoft.com/office/drawing/2014/main" id="{A052CA08-BFB4-E89B-4D92-B77BCC2B40CA}"/>
+              </a:ext>
+            </a:extLst>
+          </p:cNvPr>
+          <p:cNvSpPr>
+            <a:spLocks noGrp="1"/>
+          </p:cNvSpPr>
+          <p:nvPr>
+            <p:ph type="title"/>
+          </p:nvPr>
+        </p:nvSpPr>
+        <p:spPr>
+          <a:xfrm>
+            <a:off x="5970589" y="131546"/>
+            <a:ext cx="5664198" cy="863023"/>
+          </a:xfrm>
+        </p:spPr>
+        <p:txBody>
+          <a:bodyPr>
+            <a:normAutofit fontScale="90000"/>
+          </a:bodyPr>
+          <a:lstStyle/>
+          <a:p>
+            <a:r>
+              <a:rPr lang="en-US" dirty="0"/>
+              <a:t>Tim Rayburn</a:t>
+            </a:r>
+          </a:p>
+        </p:txBody>
+      </p:sp>
+      <p:sp>
+        <p:nvSpPr>
+          <p:cNvPr id="6" name="Content Placeholder 5">
+            <a:extLst>
+              <a:ext uri="{FF2B5EF4-FFF2-40B4-BE49-F238E27FC236}">
+                <a16:creationId xmlns:a16="http://schemas.microsoft.com/office/drawing/2014/main" id="{48FF2279-58EF-0FFD-23EC-F46B5F9C650B}"/>
+              </a:ext>
+            </a:extLst>
+          </p:cNvPr>
+          <p:cNvSpPr>
+            <a:spLocks noGrp="1"/>
+          </p:cNvSpPr>
+          <p:nvPr>
+            <p:ph sz="quarter" idx="13"/>
+          </p:nvPr>
+        </p:nvSpPr>
+        <p:spPr>
+          <a:xfrm>
+            <a:off x="5785980" y="994569"/>
+            <a:ext cx="6351199" cy="5597005"/>
+          </a:xfrm>
+        </p:spPr>
+        <p:txBody>
+          <a:bodyPr anchor="t">
+            <a:normAutofit/>
+          </a:bodyPr>
+          <a:lstStyle/>
+          <a:p>
+            <a:r>
+              <a:rPr lang="en-US" sz="1800" dirty="0"/>
+              <a:t>11-time Microsoft MVP (2007-2018)</a:t>
+            </a:r>
+          </a:p>
+          <a:p>
+            <a:r>
+              <a:rPr lang="en-US" sz="1800" dirty="0"/>
+              <a:t>Open Source Maintainer for Highway Framework</a:t>
+            </a:r>
+          </a:p>
+          <a:p>
+            <a:r>
+              <a:rPr lang="en-US" sz="1800" dirty="0"/>
+              <a:t>BBQ Fanatic – Feed over 200 people every July 4</a:t>
+            </a:r>
+            <a:r>
+              <a:rPr lang="en-US" sz="1800" baseline="30000" dirty="0"/>
+              <a:t>th</a:t>
+            </a:r>
+            <a:r>
+              <a:rPr lang="en-US" sz="1800" dirty="0"/>
+              <a:t> at the Improving Dallas office</a:t>
+            </a:r>
+          </a:p>
+          <a:p>
+            <a:r>
+              <a:rPr lang="en-US" sz="1800" dirty="0"/>
+              <a:t>Soccer Fan – Season ticket holder for FC Dallas, Followed the USWNT through the World Cup playoff rounds in France (2019)</a:t>
+            </a:r>
+          </a:p>
+          <a:p>
+            <a:r>
+              <a:rPr lang="en-US" sz="1800" dirty="0"/>
+              <a:t>Former Game Store Owner</a:t>
+            </a:r>
+          </a:p>
+          <a:p>
+            <a:r>
+              <a:rPr lang="en-US" sz="1800" dirty="0"/>
+              <a:t>Avid Magic the Gathering player (Commander)</a:t>
+            </a:r>
+          </a:p>
+          <a:p>
+            <a:r>
+              <a:rPr lang="en-US" sz="1800" dirty="0"/>
+              <a:t>Former D&amp;D Podcaster (Radio Free </a:t>
+            </a:r>
+            <a:r>
+              <a:rPr lang="en-US" sz="1800" dirty="0" err="1"/>
+              <a:t>Hommlet</a:t>
+            </a:r>
+            <a:r>
+              <a:rPr lang="en-US" sz="1800" dirty="0"/>
+              <a:t>)</a:t>
+            </a:r>
+          </a:p>
+          <a:p>
+            <a:r>
+              <a:rPr lang="en-US" sz="1800" dirty="0"/>
+              <a:t>Drone Pilot</a:t>
+            </a:r>
+          </a:p>
+          <a:p>
+            <a:r>
+              <a:rPr lang="en-US" sz="1800" dirty="0"/>
+              <a:t>Firearms Instructor</a:t>
+            </a:r>
+          </a:p>
+          <a:p>
+            <a:r>
+              <a:rPr lang="en-US" sz="1800" b="1" dirty="0"/>
+              <a:t>Specialization is for Insects.</a:t>
+            </a:r>
+          </a:p>
+        </p:txBody>
+      </p:sp>
+      <p:pic>
+        <p:nvPicPr>
+          <p:cNvPr id="9" name="Content Placeholder 9" descr="A picture containing person, person, outdoor, standing&#10;&#10;Description automatically generated">
+            <a:extLst>
+              <a:ext uri="{FF2B5EF4-FFF2-40B4-BE49-F238E27FC236}">
+                <a16:creationId xmlns:a16="http://schemas.microsoft.com/office/drawing/2014/main" id="{8B421111-3E74-15D2-B0D7-5DF537E91BA1}"/>
+              </a:ext>
+            </a:extLst>
+          </p:cNvPr>
+          <p:cNvPicPr>
+            <a:picLocks noGrp="1" noChangeAspect="1"/>
+          </p:cNvPicPr>
+          <p:nvPr>
+            <p:ph type="pic" sz="quarter" idx="17"/>
+          </p:nvPr>
+        </p:nvPicPr>
+        <p:blipFill>
+          <a:blip r:embed="rId2">
+            <a:extLst>
+              <a:ext uri="{28A0092B-C50C-407E-A947-70E740481C1C}">
+                <a14:useLocalDpi xmlns:a14="http://schemas.microsoft.com/office/drawing/2010/main" val="0"/>
+              </a:ext>
+            </a:extLst>
+          </a:blip>
+          <a:srcRect l="10532" r="10532"/>
+          <a:stretch>
+            <a:fillRect/>
+          </a:stretch>
+        </p:blipFill>
+        <p:spPr>
+          <a:xfrm>
+            <a:off x="119063" y="0"/>
+            <a:ext cx="5413375" cy="6858000"/>
+          </a:xfrm>
+        </p:spPr>
+      </p:pic>
+    </p:spTree>
+    <p:extLst>
+      <p:ext uri="{BB962C8B-B14F-4D97-AF65-F5344CB8AC3E}">
+        <p14:creationId xmlns:p14="http://schemas.microsoft.com/office/powerpoint/2010/main" val="4031217866"/>
+      </p:ext>
+    </p:extLst>
+  </p:cSld>
+  <p:clrMapOvr>
+    <a:masterClrMapping/>
+  </p:clrMapOvr>
+</p:sld>
+</file>
+
+<file path=ppt/slides/slide20.xml><?xml version="1.0" encoding="utf-8"?>
 <p:sld xmlns:a="http://schemas.openxmlformats.org/drawingml/2006/main" xmlns:r="http://schemas.openxmlformats.org/officeDocument/2006/relationships" xmlns:p="http://schemas.openxmlformats.org/presentationml/2006/main">
   <p:cSld>
     <p:spTree>
@@ -25501,7 +26290,7 @@
 </p:sld>
 </file>
 
-<file path=ppt/slides/slide2.xml><?xml version="1.0" encoding="utf-8"?>
+<file path=ppt/slides/slide3.xml><?xml version="1.0" encoding="utf-8"?>
 <p:sld xmlns:a="http://schemas.openxmlformats.org/drawingml/2006/main" xmlns:r="http://schemas.openxmlformats.org/officeDocument/2006/relationships" xmlns:p="http://schemas.openxmlformats.org/presentationml/2006/main">
   <p:cSld>
     <p:spTree>
@@ -25661,7 +26450,7 @@
 </p:sld>
 </file>
 
-<file path=ppt/slides/slide3.xml><?xml version="1.0" encoding="utf-8"?>
+<file path=ppt/slides/slide4.xml><?xml version="1.0" encoding="utf-8"?>
 <p:sld xmlns:a="http://schemas.openxmlformats.org/drawingml/2006/main" xmlns:r="http://schemas.openxmlformats.org/officeDocument/2006/relationships" xmlns:p="http://schemas.openxmlformats.org/presentationml/2006/main">
   <p:cSld>
     <p:spTree>
@@ -26032,7 +26821,7 @@
 </p:sld>
 </file>
 
-<file path=ppt/slides/slide4.xml><?xml version="1.0" encoding="utf-8"?>
+<file path=ppt/slides/slide5.xml><?xml version="1.0" encoding="utf-8"?>
 <p:sld xmlns:a="http://schemas.openxmlformats.org/drawingml/2006/main" xmlns:r="http://schemas.openxmlformats.org/officeDocument/2006/relationships" xmlns:p="http://schemas.openxmlformats.org/presentationml/2006/main">
   <p:cSld>
     <p:spTree>
@@ -26192,7 +26981,7 @@
 </p:sld>
 </file>
 
-<file path=ppt/slides/slide5.xml><?xml version="1.0" encoding="utf-8"?>
+<file path=ppt/slides/slide6.xml><?xml version="1.0" encoding="utf-8"?>
 <p:sld xmlns:a="http://schemas.openxmlformats.org/drawingml/2006/main" xmlns:r="http://schemas.openxmlformats.org/officeDocument/2006/relationships" xmlns:p="http://schemas.openxmlformats.org/presentationml/2006/main">
   <p:cSld>
     <p:spTree>
@@ -26563,7 +27352,7 @@
 </p:sld>
 </file>
 
-<file path=ppt/slides/slide6.xml><?xml version="1.0" encoding="utf-8"?>
+<file path=ppt/slides/slide7.xml><?xml version="1.0" encoding="utf-8"?>
 <p:sld xmlns:a="http://schemas.openxmlformats.org/drawingml/2006/main" xmlns:r="http://schemas.openxmlformats.org/officeDocument/2006/relationships" xmlns:p="http://schemas.openxmlformats.org/presentationml/2006/main">
   <p:cSld>
     <p:spTree>
@@ -26723,7 +27512,7 @@
 </p:sld>
 </file>
 
-<file path=ppt/slides/slide7.xml><?xml version="1.0" encoding="utf-8"?>
+<file path=ppt/slides/slide8.xml><?xml version="1.0" encoding="utf-8"?>
 <p:sld xmlns:a="http://schemas.openxmlformats.org/drawingml/2006/main" xmlns:r="http://schemas.openxmlformats.org/officeDocument/2006/relationships" xmlns:p="http://schemas.openxmlformats.org/presentationml/2006/main">
   <p:cSld>
     <p:spTree>
@@ -27098,201 +27887,6 @@
 </p:sld>
 </file>
 
-<file path=ppt/slides/slide8.xml><?xml version="1.0" encoding="utf-8"?>
-<p:sld xmlns:a="http://schemas.openxmlformats.org/drawingml/2006/main" xmlns:r="http://schemas.openxmlformats.org/officeDocument/2006/relationships" xmlns:p="http://schemas.openxmlformats.org/presentationml/2006/main">
-  <p:cSld>
-    <p:spTree>
-      <p:nvGrpSpPr>
-        <p:cNvPr id="1" name=""/>
-        <p:cNvGrpSpPr/>
-        <p:nvPr/>
-      </p:nvGrpSpPr>
-      <p:grpSpPr>
-        <a:xfrm>
-          <a:off x="0" y="0"/>
-          <a:ext cx="0" cy="0"/>
-          <a:chOff x="0" y="0"/>
-          <a:chExt cx="0" cy="0"/>
-        </a:xfrm>
-      </p:grpSpPr>
-      <p:sp>
-        <p:nvSpPr>
-          <p:cNvPr id="2" name="Title 1">
-            <a:extLst>
-              <a:ext uri="{FF2B5EF4-FFF2-40B4-BE49-F238E27FC236}">
-                <a16:creationId xmlns:a16="http://schemas.microsoft.com/office/drawing/2014/main" id="{F943BBDF-3479-BFE8-20B9-A4E397309DE1}"/>
-              </a:ext>
-            </a:extLst>
-          </p:cNvPr>
-          <p:cNvSpPr>
-            <a:spLocks noGrp="1"/>
-          </p:cNvSpPr>
-          <p:nvPr>
-            <p:ph type="title"/>
-          </p:nvPr>
-        </p:nvSpPr>
-        <p:spPr/>
-        <p:txBody>
-          <a:bodyPr/>
-          <a:lstStyle/>
-          <a:p>
-            <a:r>
-              <a:rPr lang="en-US" dirty="0"/>
-              <a:t>The Protocol for </a:t>
-            </a:r>
-            <a:br>
-              <a:rPr lang="en-US" dirty="0"/>
-            </a:br>
-            <a:r>
-              <a:rPr lang="en-US" dirty="0"/>
-              <a:t>Direct AI Connections</a:t>
-            </a:r>
-          </a:p>
-        </p:txBody>
-      </p:sp>
-      <p:pic>
-        <p:nvPicPr>
-          <p:cNvPr id="6" name="Picture Placeholder 5" descr="Moving bus">
-            <a:extLst>
-              <a:ext uri="{FF2B5EF4-FFF2-40B4-BE49-F238E27FC236}">
-                <a16:creationId xmlns:a16="http://schemas.microsoft.com/office/drawing/2014/main" id="{4410B7F8-9126-7450-5CE8-A8AD17D4B9E5}"/>
-              </a:ext>
-            </a:extLst>
-          </p:cNvPr>
-          <p:cNvPicPr>
-            <a:picLocks noGrp="1" noChangeAspect="1"/>
-          </p:cNvPicPr>
-          <p:nvPr>
-            <p:ph type="pic" sz="quarter" idx="15"/>
-          </p:nvPr>
-        </p:nvPicPr>
-        <p:blipFill>
-          <a:blip r:embed="rId2" cstate="print">
-            <a:extLst>
-              <a:ext uri="{28A0092B-C50C-407E-A947-70E740481C1C}">
-                <a14:useLocalDpi xmlns:a14="http://schemas.microsoft.com/office/drawing/2010/main" val="0"/>
-              </a:ext>
-            </a:extLst>
-          </a:blip>
-          <a:srcRect l="11332" r="11332"/>
-          <a:stretch>
-            <a:fillRect/>
-          </a:stretch>
-        </p:blipFill>
-        <p:spPr/>
-      </p:pic>
-      <p:sp>
-        <p:nvSpPr>
-          <p:cNvPr id="4" name="Content Placeholder 3">
-            <a:extLst>
-              <a:ext uri="{FF2B5EF4-FFF2-40B4-BE49-F238E27FC236}">
-                <a16:creationId xmlns:a16="http://schemas.microsoft.com/office/drawing/2014/main" id="{B1761C51-E898-52AF-E1C9-FA5EF15AA94E}"/>
-              </a:ext>
-            </a:extLst>
-          </p:cNvPr>
-          <p:cNvSpPr>
-            <a:spLocks noGrp="1"/>
-          </p:cNvSpPr>
-          <p:nvPr>
-            <p:ph sz="quarter" idx="14"/>
-          </p:nvPr>
-        </p:nvSpPr>
-        <p:spPr/>
-        <p:txBody>
-          <a:bodyPr/>
-          <a:lstStyle/>
-          <a:p>
-            <a:pPr marL="0" indent="0">
-              <a:spcBef>
-                <a:spcPts val="2500"/>
-              </a:spcBef>
-              <a:buNone/>
-            </a:pPr>
-            <a:r>
-              <a:rPr lang="en-US" sz="1800" b="1" dirty="0"/>
-              <a:t>Does not solve Tool or Agent Discovery</a:t>
-            </a:r>
-          </a:p>
-          <a:p>
-            <a:pPr marL="0" lvl="1" indent="0">
-              <a:buNone/>
-            </a:pPr>
-            <a:r>
-              <a:rPr lang="en-US" sz="1800" dirty="0"/>
-              <a:t>You need some sort of registry to find MCP servers either that you can run, or that are hosted online.</a:t>
-            </a:r>
-          </a:p>
-          <a:p>
-            <a:pPr marL="0" indent="0">
-              <a:spcBef>
-                <a:spcPts val="2500"/>
-              </a:spcBef>
-              <a:buNone/>
-            </a:pPr>
-            <a:r>
-              <a:rPr lang="en-US" sz="1800" b="1" dirty="0"/>
-              <a:t>Does not let one tool directly call another</a:t>
-            </a:r>
-          </a:p>
-          <a:p>
-            <a:pPr marL="0" lvl="1" indent="0">
-              <a:buNone/>
-            </a:pPr>
-            <a:r>
-              <a:rPr lang="en-US" sz="1800" dirty="0"/>
-              <a:t>This does not handle </a:t>
-            </a:r>
-            <a:r>
-              <a:rPr lang="en-US" sz="1800" dirty="0" err="1"/>
-              <a:t>eventing</a:t>
-            </a:r>
-            <a:r>
-              <a:rPr lang="en-US" sz="1800" dirty="0"/>
-              <a:t> between agents.</a:t>
-            </a:r>
-          </a:p>
-          <a:p>
-            <a:pPr marL="0" indent="0">
-              <a:spcBef>
-                <a:spcPts val="2500"/>
-              </a:spcBef>
-              <a:buNone/>
-            </a:pPr>
-            <a:r>
-              <a:rPr lang="en-US" sz="1800" b="1" dirty="0"/>
-              <a:t>Protocol Adoption is In Progress</a:t>
-            </a:r>
-          </a:p>
-          <a:p>
-            <a:pPr marL="0" lvl="1" indent="0">
-              <a:buNone/>
-            </a:pPr>
-            <a:r>
-              <a:rPr lang="en-US" sz="1800" dirty="0"/>
-              <a:t>The protocol has become the clear front-runner in the space, but few tools fully support it today.</a:t>
-            </a:r>
-          </a:p>
-          <a:p>
-            <a:pPr marL="0" indent="0">
-              <a:buNone/>
-            </a:pPr>
-            <a:endParaRPr lang="en-US" dirty="0"/>
-          </a:p>
-        </p:txBody>
-      </p:sp>
-    </p:spTree>
-    <p:extLst>
-      <p:ext uri="{BB962C8B-B14F-4D97-AF65-F5344CB8AC3E}">
-        <p14:creationId xmlns:p14="http://schemas.microsoft.com/office/powerpoint/2010/main" val="3262718414"/>
-      </p:ext>
-    </p:extLst>
-  </p:cSld>
-  <p:clrMapOvr>
-    <a:masterClrMapping/>
-  </p:clrMapOvr>
-</p:sld>
-</file>
-
 <file path=ppt/slides/slide9.xml><?xml version="1.0" encoding="utf-8"?>
 <p:sld xmlns:a="http://schemas.openxmlformats.org/drawingml/2006/main" xmlns:r="http://schemas.openxmlformats.org/officeDocument/2006/relationships" xmlns:p="http://schemas.openxmlformats.org/presentationml/2006/main">
   <p:cSld>
@@ -27312,18 +27906,18 @@
       </p:grpSpPr>
       <p:sp>
         <p:nvSpPr>
-          <p:cNvPr id="5" name="Title 4">
-            <a:extLst>
-              <a:ext uri="{FF2B5EF4-FFF2-40B4-BE49-F238E27FC236}">
-                <a16:creationId xmlns:a16="http://schemas.microsoft.com/office/drawing/2014/main" id="{A18D4A22-5F39-C9F4-EF5A-FB81BC8128D7}"/>
-              </a:ext>
-            </a:extLst>
-          </p:cNvPr>
-          <p:cNvSpPr>
-            <a:spLocks noGrp="1"/>
-          </p:cNvSpPr>
-          <p:nvPr>
-            <p:ph type="ctrTitle"/>
+          <p:cNvPr id="2" name="Title 1">
+            <a:extLst>
+              <a:ext uri="{FF2B5EF4-FFF2-40B4-BE49-F238E27FC236}">
+                <a16:creationId xmlns:a16="http://schemas.microsoft.com/office/drawing/2014/main" id="{F943BBDF-3479-BFE8-20B9-A4E397309DE1}"/>
+              </a:ext>
+            </a:extLst>
+          </p:cNvPr>
+          <p:cNvSpPr>
+            <a:spLocks noGrp="1"/>
+          </p:cNvSpPr>
+          <p:nvPr>
+            <p:ph type="title"/>
           </p:nvPr>
         </p:nvSpPr>
         <p:spPr/>
@@ -27333,25 +27927,63 @@
           <a:p>
             <a:r>
               <a:rPr lang="en-US" dirty="0"/>
-              <a:t>GitHub Remote Server</a:t>
-            </a:r>
-          </a:p>
-        </p:txBody>
-      </p:sp>
-      <p:sp>
-        <p:nvSpPr>
-          <p:cNvPr id="6" name="Subtitle 5">
-            <a:extLst>
-              <a:ext uri="{FF2B5EF4-FFF2-40B4-BE49-F238E27FC236}">
-                <a16:creationId xmlns:a16="http://schemas.microsoft.com/office/drawing/2014/main" id="{43994C03-9C0C-B305-596C-072F88C94D5B}"/>
-              </a:ext>
-            </a:extLst>
-          </p:cNvPr>
-          <p:cNvSpPr>
-            <a:spLocks noGrp="1"/>
-          </p:cNvSpPr>
-          <p:nvPr>
-            <p:ph type="subTitle" idx="1"/>
+              <a:t>The Protocol for </a:t>
+            </a:r>
+            <a:br>
+              <a:rPr lang="en-US" dirty="0"/>
+            </a:br>
+            <a:r>
+              <a:rPr lang="en-US" dirty="0"/>
+              <a:t>Direct AI Connections</a:t>
+            </a:r>
+          </a:p>
+        </p:txBody>
+      </p:sp>
+      <p:pic>
+        <p:nvPicPr>
+          <p:cNvPr id="6" name="Picture Placeholder 5" descr="Moving bus">
+            <a:extLst>
+              <a:ext uri="{FF2B5EF4-FFF2-40B4-BE49-F238E27FC236}">
+                <a16:creationId xmlns:a16="http://schemas.microsoft.com/office/drawing/2014/main" id="{4410B7F8-9126-7450-5CE8-A8AD17D4B9E5}"/>
+              </a:ext>
+            </a:extLst>
+          </p:cNvPr>
+          <p:cNvPicPr>
+            <a:picLocks noGrp="1" noChangeAspect="1"/>
+          </p:cNvPicPr>
+          <p:nvPr>
+            <p:ph type="pic" sz="quarter" idx="15"/>
+          </p:nvPr>
+        </p:nvPicPr>
+        <p:blipFill>
+          <a:blip r:embed="rId2" cstate="print">
+            <a:extLst>
+              <a:ext uri="{28A0092B-C50C-407E-A947-70E740481C1C}">
+                <a14:useLocalDpi xmlns:a14="http://schemas.microsoft.com/office/drawing/2010/main" val="0"/>
+              </a:ext>
+            </a:extLst>
+          </a:blip>
+          <a:srcRect l="11332" r="11332"/>
+          <a:stretch>
+            <a:fillRect/>
+          </a:stretch>
+        </p:blipFill>
+        <p:spPr/>
+      </p:pic>
+      <p:sp>
+        <p:nvSpPr>
+          <p:cNvPr id="4" name="Content Placeholder 3">
+            <a:extLst>
+              <a:ext uri="{FF2B5EF4-FFF2-40B4-BE49-F238E27FC236}">
+                <a16:creationId xmlns:a16="http://schemas.microsoft.com/office/drawing/2014/main" id="{B1761C51-E898-52AF-E1C9-FA5EF15AA94E}"/>
+              </a:ext>
+            </a:extLst>
+          </p:cNvPr>
+          <p:cNvSpPr>
+            <a:spLocks noGrp="1"/>
+          </p:cNvSpPr>
+          <p:nvPr>
+            <p:ph sz="quarter" idx="14"/>
           </p:nvPr>
         </p:nvSpPr>
         <p:spPr/>
@@ -27359,17 +27991,88 @@
           <a:bodyPr/>
           <a:lstStyle/>
           <a:p>
-            <a:r>
-              <a:rPr lang="en-US" dirty="0"/>
-              <a:t>Demonstration</a:t>
-            </a:r>
+            <a:pPr marL="0" indent="0">
+              <a:spcBef>
+                <a:spcPts val="2500"/>
+              </a:spcBef>
+              <a:buNone/>
+            </a:pPr>
+            <a:r>
+              <a:rPr lang="en-US" sz="1800" b="1" dirty="0"/>
+              <a:t>Does not solve Tool or Agent Discovery</a:t>
+            </a:r>
+          </a:p>
+          <a:p>
+            <a:pPr marL="0" lvl="1" indent="0">
+              <a:buNone/>
+            </a:pPr>
+            <a:r>
+              <a:rPr lang="en-US" sz="1800" dirty="0"/>
+              <a:t>You need some sort of registry to find MCP servers either that you can run, or that are hosted online.</a:t>
+            </a:r>
+          </a:p>
+          <a:p>
+            <a:pPr marL="0" indent="0">
+              <a:spcBef>
+                <a:spcPts val="2500"/>
+              </a:spcBef>
+              <a:buNone/>
+            </a:pPr>
+            <a:r>
+              <a:rPr lang="en-US" sz="1800" b="1" dirty="0"/>
+              <a:t>Does not let one tool directly call another</a:t>
+            </a:r>
+          </a:p>
+          <a:p>
+            <a:pPr marL="0" lvl="1" indent="0">
+              <a:buNone/>
+            </a:pPr>
+            <a:r>
+              <a:rPr lang="en-US" sz="1800" dirty="0"/>
+              <a:t>This does not handle </a:t>
+            </a:r>
+            <a:r>
+              <a:rPr lang="en-US" sz="1800" dirty="0" err="1"/>
+              <a:t>eventing</a:t>
+            </a:r>
+            <a:r>
+              <a:rPr lang="en-US" sz="1800" dirty="0"/>
+              <a:t> between agents.</a:t>
+            </a:r>
+          </a:p>
+          <a:p>
+            <a:pPr marL="0" indent="0">
+              <a:spcBef>
+                <a:spcPts val="2500"/>
+              </a:spcBef>
+              <a:buNone/>
+            </a:pPr>
+            <a:r>
+              <a:rPr lang="en-US" sz="1800" b="1" dirty="0"/>
+              <a:t>Protocol Adoption is In Progress</a:t>
+            </a:r>
+          </a:p>
+          <a:p>
+            <a:pPr marL="0" lvl="1" indent="0">
+              <a:buNone/>
+            </a:pPr>
+            <a:r>
+              <a:rPr lang="en-US" sz="1800" dirty="0"/>
+              <a:t>The protocol has become the clear front-runner in the space, but few tools fully support it today.</a:t>
+            </a:r>
+          </a:p>
+          <a:p>
+            <a:pPr marL="0" indent="0">
+              <a:buNone/>
+            </a:pPr>
+            <a:endParaRPr lang="en-US" dirty="0"/>
           </a:p>
         </p:txBody>
       </p:sp>
     </p:spTree>
     <p:extLst>
       <p:ext uri="{BB962C8B-B14F-4D97-AF65-F5344CB8AC3E}">
-        <p14:creationId xmlns:p14="http://schemas.microsoft.com/office/powerpoint/2010/main" val="1803766686"/>
+        <p14:creationId xmlns:p14="http://schemas.microsoft.com/office/powerpoint/2010/main" val="3262718414"/>
       </p:ext>
     </p:extLst>
   </p:cSld>

</xml_diff>